<commit_message>
Modified names of components
</commit_message>
<xml_diff>
--- a/Documents/Architecture/nervousnet.pptx
+++ b/Documents/Architecture/nervousnet.pptx
@@ -3698,7 +3698,7 @@
           <a:p>
             <a:fld id="{E29EADBD-8C2A-0E4C-92CE-5EBFF6224A3A}" type="datetime1">
               <a:rPr lang="en-US" smtClean="0"/>
-              <a:t>06/04/16</a:t>
+              <a:t>19/04/16</a:t>
             </a:fld>
             <a:endParaRPr lang="en-US"/>
           </a:p>
@@ -3868,7 +3868,7 @@
           <a:p>
             <a:fld id="{00A2197B-82DA-B840-975D-6BA3EE4C2DC8}" type="datetime1">
               <a:rPr lang="en-US" smtClean="0"/>
-              <a:t>06/04/16</a:t>
+              <a:t>19/04/16</a:t>
             </a:fld>
             <a:endParaRPr lang="en-US"/>
           </a:p>
@@ -4696,7 +4696,7 @@
           <a:p>
             <a:fld id="{D9367090-103A-FA49-A3B4-31066D77167B}" type="datetime1">
               <a:rPr lang="en-US" smtClean="0"/>
-              <a:t>06/04/16</a:t>
+              <a:t>19/04/16</a:t>
             </a:fld>
             <a:endParaRPr lang="en-US"/>
           </a:p>
@@ -5021,7 +5021,7 @@
           <a:p>
             <a:fld id="{ABC2C74B-38EB-6142-981A-F4874F5C558C}" type="datetime1">
               <a:rPr lang="en-US" smtClean="0"/>
-              <a:t>06/04/16</a:t>
+              <a:t>19/04/16</a:t>
             </a:fld>
             <a:endParaRPr lang="en-US"/>
           </a:p>
@@ -5302,7 +5302,7 @@
           <a:p>
             <a:fld id="{2E308B6A-9F4E-B64E-B36C-0598F402E0B0}" type="datetime1">
               <a:rPr lang="en-US" smtClean="0"/>
-              <a:t>06/04/16</a:t>
+              <a:t>19/04/16</a:t>
             </a:fld>
             <a:endParaRPr lang="en-US"/>
           </a:p>
@@ -5600,7 +5600,7 @@
           <a:p>
             <a:fld id="{85937D96-DDC1-4747-AA95-A033CACCB96C}" type="datetime1">
               <a:rPr lang="en-US" smtClean="0"/>
-              <a:t>06/04/16</a:t>
+              <a:t>19/04/16</a:t>
             </a:fld>
             <a:endParaRPr lang="en-US"/>
           </a:p>
@@ -5933,7 +5933,7 @@
           <a:p>
             <a:fld id="{5321CDED-9626-FA46-9EE7-E82FB8600649}" type="datetime1">
               <a:rPr lang="en-US" smtClean="0"/>
-              <a:t>06/04/16</a:t>
+              <a:t>19/04/16</a:t>
             </a:fld>
             <a:endParaRPr lang="en-US"/>
           </a:p>
@@ -6188,7 +6188,7 @@
           <a:p>
             <a:fld id="{1C24507A-5856-C541-981B-4412383053C8}" type="datetime1">
               <a:rPr lang="en-US" smtClean="0"/>
-              <a:t>06/04/16</a:t>
+              <a:t>19/04/16</a:t>
             </a:fld>
             <a:endParaRPr lang="en-US"/>
           </a:p>
@@ -6371,7 +6371,7 @@
           <a:p>
             <a:fld id="{6905DD47-EC52-8743-A4BF-BDFBFBA3AE81}" type="datetime1">
               <a:rPr lang="en-US" smtClean="0"/>
-              <a:t>06/04/16</a:t>
+              <a:t>19/04/16</a:t>
             </a:fld>
             <a:endParaRPr lang="en-US"/>
           </a:p>
@@ -6544,7 +6544,7 @@
           <a:p>
             <a:fld id="{1D77DB73-494B-5E4A-8019-F4524E111BAF}" type="datetime1">
               <a:rPr lang="en-US" smtClean="0"/>
-              <a:t>06/04/16</a:t>
+              <a:t>19/04/16</a:t>
             </a:fld>
             <a:endParaRPr lang="en-US"/>
           </a:p>
@@ -6817,7 +6817,7 @@
           <a:p>
             <a:fld id="{5A88EB98-4821-3849-86D7-AEAB3699D07C}" type="datetime1">
               <a:rPr lang="en-US" smtClean="0"/>
-              <a:t>06/04/16</a:t>
+              <a:t>19/04/16</a:t>
             </a:fld>
             <a:endParaRPr lang="en-US"/>
           </a:p>
@@ -7128,7 +7128,7 @@
           <a:p>
             <a:fld id="{E2211E45-9E9F-C742-80C0-3820C3566BB1}" type="datetime1">
               <a:rPr lang="en-US" smtClean="0"/>
-              <a:t>06/04/16</a:t>
+              <a:t>19/04/16</a:t>
             </a:fld>
             <a:endParaRPr lang="en-US"/>
           </a:p>
@@ -7424,7 +7424,7 @@
           <a:p>
             <a:fld id="{CB5CC828-769C-E54C-9215-692401F93968}" type="datetime1">
               <a:rPr lang="en-US" smtClean="0"/>
-              <a:t>06/04/16</a:t>
+              <a:t>19/04/16</a:t>
             </a:fld>
             <a:endParaRPr lang="en-US"/>
           </a:p>
@@ -7858,7 +7858,7 @@
           <a:p>
             <a:fld id="{1AA2AE0E-A114-5642-B6C6-FD149E76306E}" type="datetime1">
               <a:rPr lang="en-US" smtClean="0"/>
-              <a:t>06/04/16</a:t>
+              <a:t>19/04/16</a:t>
             </a:fld>
             <a:endParaRPr lang="en-US"/>
           </a:p>
@@ -8208,7 +8208,7 @@
           <a:p>
             <a:fld id="{8A715A52-2182-4049-98B2-F3202A644989}" type="datetime1">
               <a:rPr lang="en-US" smtClean="0"/>
-              <a:t>06/04/16</a:t>
+              <a:t>19/04/16</a:t>
             </a:fld>
             <a:endParaRPr lang="en-US"/>
           </a:p>
@@ -8302,7 +8302,7 @@
           <a:p>
             <a:fld id="{3CF4FDC8-DC40-7C44-B03A-3EFB3AAE78B7}" type="datetime1">
               <a:rPr lang="en-US" smtClean="0"/>
-              <a:t>06/04/16</a:t>
+              <a:t>19/04/16</a:t>
             </a:fld>
             <a:endParaRPr lang="en-US"/>
           </a:p>
@@ -8643,7 +8643,7 @@
           <a:p>
             <a:fld id="{22BC680A-A1C5-9D47-898A-4B941B6FDB12}" type="datetime1">
               <a:rPr lang="en-US" smtClean="0"/>
-              <a:t>06/04/16</a:t>
+              <a:t>19/04/16</a:t>
             </a:fld>
             <a:endParaRPr lang="en-US"/>
           </a:p>
@@ -8859,7 +8859,7 @@
           <a:p>
             <a:fld id="{A94D9655-E859-0A4D-ABA6-66C7095048D0}" type="datetime1">
               <a:rPr lang="en-US" smtClean="0"/>
-              <a:t>06/04/16</a:t>
+              <a:t>19/04/16</a:t>
             </a:fld>
             <a:endParaRPr lang="en-US"/>
           </a:p>
@@ -10876,7 +10876,7 @@
         <p:spPr>
           <a:xfrm>
             <a:off x="2360479" y="1676361"/>
-            <a:ext cx="389850" cy="215444"/>
+            <a:ext cx="768109" cy="215444"/>
           </a:xfrm>
           <a:prstGeom prst="rect">
             <a:avLst/>
@@ -10891,7 +10891,7 @@
           <a:p>
             <a:r>
               <a:rPr lang="en-US" sz="800" dirty="0" smtClean="0"/>
-              <a:t>HUB</a:t>
+              <a:t>Mobile App</a:t>
             </a:r>
             <a:endParaRPr lang="en-US" sz="800" dirty="0"/>
           </a:p>
@@ -11314,8 +11314,8 @@
         </p:nvSpPr>
         <p:spPr>
           <a:xfrm>
-            <a:off x="14637" y="1165917"/>
-            <a:ext cx="684803" cy="461665"/>
+            <a:off x="117229" y="1165917"/>
+            <a:ext cx="479618" cy="215444"/>
           </a:xfrm>
           <a:prstGeom prst="rect">
             <a:avLst/>
@@ -11327,20 +11327,6 @@
             <a:spAutoFit/>
           </a:bodyPr>
           <a:lstStyle/>
-          <a:p>
-            <a:pPr algn="ctr"/>
-            <a:r>
-              <a:rPr lang="en-US" sz="800" dirty="0" smtClean="0"/>
-              <a:t>Extensions</a:t>
-            </a:r>
-          </a:p>
-          <a:p>
-            <a:pPr algn="ctr"/>
-            <a:r>
-              <a:rPr lang="en-US" sz="800" dirty="0" smtClean="0"/>
-              <a:t>Or</a:t>
-            </a:r>
-          </a:p>
           <a:p>
             <a:pPr algn="ctr"/>
             <a:r>
@@ -13194,7 +13180,7 @@
         <p:spPr>
           <a:xfrm>
             <a:off x="890943" y="666715"/>
-            <a:ext cx="7478222" cy="5232202"/>
+            <a:ext cx="7478222" cy="5386091"/>
           </a:xfrm>
           <a:prstGeom prst="rect">
             <a:avLst/>
@@ -13213,7 +13199,7 @@
             </a:pPr>
             <a:r>
               <a:rPr lang="en-US" sz="1100" b="1" dirty="0" smtClean="0"/>
-              <a:t>HUB - </a:t>
+              <a:t>Mobile App- </a:t>
             </a:r>
             <a:r>
               <a:rPr lang="en-US" sz="1000" dirty="0" smtClean="0"/>
@@ -13246,7 +13232,15 @@
             </a:pPr>
             <a:r>
               <a:rPr lang="en-US" sz="1000" dirty="0" smtClean="0"/>
-              <a:t>Required to be installed for running external apps (Extensions and Axons) built using</a:t>
+              <a:t>Required to be installed for running external apps </a:t>
+            </a:r>
+            <a:r>
+              <a:rPr lang="en-US" sz="1000" dirty="0" smtClean="0"/>
+              <a:t>(Axons</a:t>
+            </a:r>
+            <a:r>
+              <a:rPr lang="en-US" sz="1000" dirty="0" smtClean="0"/>
+              <a:t>) built using</a:t>
             </a:r>
             <a:r>
               <a:rPr lang="en-US" sz="1000" b="1" i="1" dirty="0" smtClean="0"/>
@@ -13258,7 +13252,15 @@
             </a:r>
             <a:r>
               <a:rPr lang="en-US" sz="1000" b="1" i="1" dirty="0" smtClean="0"/>
-              <a:t>ervousnet HUB API’s</a:t>
+              <a:t>ervousnet </a:t>
+            </a:r>
+            <a:r>
+              <a:rPr lang="en-US" sz="1000" b="1" i="1" dirty="0" err="1" smtClean="0"/>
+              <a:t>Platform</a:t>
+            </a:r>
+            <a:r>
+              <a:rPr lang="en-US" sz="1000" b="1" i="1" dirty="0" err="1" smtClean="0"/>
+              <a:t>API’s</a:t>
             </a:r>
             <a:r>
               <a:rPr lang="en-US" sz="1000" dirty="0" smtClean="0"/>
@@ -13325,7 +13327,7 @@
             </a:pPr>
             <a:r>
               <a:rPr lang="en-US" sz="1100" b="1" dirty="0" smtClean="0"/>
-              <a:t>Extensions - </a:t>
+              <a:t>Axons (Native)- </a:t>
             </a:r>
             <a:r>
               <a:rPr lang="en-US" sz="1000" dirty="0" smtClean="0"/>
@@ -13347,7 +13349,19 @@
             </a:pPr>
             <a:r>
               <a:rPr lang="en-US" sz="1000" dirty="0" smtClean="0"/>
-              <a:t>Uses the nervousnet HUB API's to receive and share sensor data.  </a:t>
+              <a:t>Uses the nervousnet </a:t>
+            </a:r>
+            <a:r>
+              <a:rPr lang="en-US" sz="1000" dirty="0" smtClean="0"/>
+              <a:t>Platform </a:t>
+            </a:r>
+            <a:r>
+              <a:rPr lang="en-US" sz="1000" dirty="0" smtClean="0"/>
+              <a:t>API's </a:t>
+            </a:r>
+            <a:r>
+              <a:rPr lang="en-US" sz="1000" dirty="0" smtClean="0"/>
+              <a:t>to receive and share sensor data.  </a:t>
             </a:r>
           </a:p>
           <a:p>
@@ -13371,11 +13385,7 @@
             </a:r>
             <a:r>
               <a:rPr lang="en-US" sz="1000" dirty="0" smtClean="0"/>
-              <a:t>ses the Android background services feature</a:t>
-            </a:r>
-            <a:r>
-              <a:rPr lang="en-US" sz="1000" dirty="0" smtClean="0"/>
-              <a:t>.</a:t>
+              <a:t>ses the Android background services feature.</a:t>
             </a:r>
           </a:p>
           <a:p>
@@ -13385,11 +13395,7 @@
             </a:pPr>
             <a:r>
               <a:rPr lang="en-US" sz="1000" dirty="0" smtClean="0"/>
-              <a:t>Possibility of </a:t>
-            </a:r>
-            <a:r>
-              <a:rPr lang="en-US" sz="1000" dirty="0" smtClean="0"/>
-              <a:t>using </a:t>
+              <a:t>Possibility of using </a:t>
             </a:r>
             <a:r>
               <a:rPr lang="en-US" sz="1000" u="sng" dirty="0" smtClean="0"/>
@@ -13405,8 +13411,17 @@
             </a:r>
             <a:r>
               <a:rPr lang="en-US" sz="1000" dirty="0" smtClean="0"/>
-              <a:t>to do connect to the nervousnet HUB.</a:t>
-            </a:r>
+              <a:t>to do connect to the nervousnet </a:t>
+            </a:r>
+            <a:r>
+              <a:rPr lang="en-US" sz="1000" dirty="0" smtClean="0"/>
+              <a:t>mobile app</a:t>
+            </a:r>
+            <a:r>
+              <a:rPr lang="en-US" sz="1000" dirty="0" smtClean="0"/>
+              <a:t>.</a:t>
+            </a:r>
+            <a:endParaRPr lang="en-US" sz="1000" dirty="0" smtClean="0"/>
           </a:p>
           <a:p>
             <a:pPr lvl="1" algn="just"/>
@@ -13418,7 +13433,7 @@
               <a:buAutoNum type="arabicPeriod"/>
             </a:pPr>
             <a:r>
-              <a:rPr lang="en-US" sz="1100" b="1" dirty="0"/>
+              <a:rPr lang="en-US" sz="1100" b="1" dirty="0" smtClean="0"/>
               <a:t>Axons </a:t>
             </a:r>
             <a:r>
@@ -13437,11 +13452,7 @@
             </a:pPr>
             <a:r>
               <a:rPr lang="en-US" sz="1000" dirty="0" smtClean="0"/>
-              <a:t>Currently </a:t>
-            </a:r>
-            <a:r>
-              <a:rPr lang="en-US" sz="1000" dirty="0" smtClean="0"/>
-              <a:t>supported on the iOS platform.</a:t>
+              <a:t>Currently supported on the iOS platform.</a:t>
             </a:r>
           </a:p>
           <a:p>
@@ -13476,11 +13487,7 @@
             </a:r>
             <a:r>
               <a:rPr lang="en-US" sz="1000" dirty="0" smtClean="0"/>
-              <a:t>Distributed and Decentralized set of </a:t>
-            </a:r>
-            <a:r>
-              <a:rPr lang="en-US" sz="1000" dirty="0" smtClean="0"/>
-              <a:t>Servers </a:t>
+              <a:t>Distributed and Decentralized set of Servers </a:t>
             </a:r>
           </a:p>
           <a:p>
@@ -13500,11 +13507,7 @@
             </a:pPr>
             <a:r>
               <a:rPr lang="en-US" sz="1000" dirty="0" smtClean="0"/>
-              <a:t>Individual </a:t>
-            </a:r>
-            <a:r>
-              <a:rPr lang="en-US" sz="1000" dirty="0" smtClean="0"/>
-              <a:t>Servers are called </a:t>
+              <a:t>Individual Servers are called </a:t>
             </a:r>
             <a:r>
               <a:rPr lang="en-US" sz="1000" b="1" dirty="0" smtClean="0"/>
@@ -13522,11 +13525,7 @@
             </a:pPr>
             <a:r>
               <a:rPr lang="en-US" sz="1000" dirty="0" smtClean="0"/>
-              <a:t>Mobile Clients will have the option of selecting a server from a list</a:t>
-            </a:r>
-            <a:r>
-              <a:rPr lang="en-US" sz="1000" dirty="0" smtClean="0"/>
-              <a:t>.</a:t>
+              <a:t>Mobile Clients will have the option of selecting a server from a list.</a:t>
             </a:r>
           </a:p>
           <a:p>
@@ -14407,8 +14406,8 @@
         </p:nvSpPr>
         <p:spPr>
           <a:xfrm>
-            <a:off x="7711142" y="4065104"/>
-            <a:ext cx="1052654" cy="230832"/>
+            <a:off x="7117376" y="4065104"/>
+            <a:ext cx="2084924" cy="230832"/>
           </a:xfrm>
           <a:prstGeom prst="rect">
             <a:avLst/>
@@ -14416,7 +14415,7 @@
           <a:noFill/>
         </p:spPr>
         <p:txBody>
-          <a:bodyPr wrap="none" rtlCol="0">
+          <a:bodyPr wrap="square" rtlCol="0">
             <a:spAutoFit/>
           </a:bodyPr>
           <a:lstStyle/>
@@ -14429,8 +14428,25 @@
                   </a:schemeClr>
                 </a:solidFill>
               </a:rPr>
-              <a:t>nervousnet HUB</a:t>
-            </a:r>
+              <a:t>nervousnet </a:t>
+            </a:r>
+            <a:r>
+              <a:rPr lang="en-US" sz="900" b="1" dirty="0" smtClean="0">
+                <a:solidFill>
+                  <a:schemeClr val="bg1">
+                    <a:lumMod val="75000"/>
+                  </a:schemeClr>
+                </a:solidFill>
+              </a:rPr>
+              <a:t>mobile App</a:t>
+            </a:r>
+            <a:endParaRPr lang="en-US" sz="900" b="1" dirty="0">
+              <a:solidFill>
+                <a:schemeClr val="bg1">
+                  <a:lumMod val="75000"/>
+                </a:schemeClr>
+              </a:solidFill>
+            </a:endParaRPr>
           </a:p>
         </p:txBody>
       </p:sp>
@@ -15082,7 +15098,7 @@
         </p:nvSpPr>
         <p:spPr>
           <a:xfrm>
-            <a:off x="1824795" y="902728"/>
+            <a:off x="1777405" y="902728"/>
             <a:ext cx="1266339" cy="184666"/>
           </a:xfrm>
           <a:prstGeom prst="rect">
@@ -15106,7 +15122,7 @@
                   <a:srgbClr val="7F7F7F"/>
                 </a:solidFill>
               </a:rPr>
-              <a:t>Extensions</a:t>
+              <a:t>Native Axons </a:t>
             </a:r>
             <a:endParaRPr lang="en-US" sz="600" dirty="0">
               <a:solidFill>

</xml_diff>

<commit_message>
Updated icons, and changed naming and add Research Paper
</commit_message>
<xml_diff>
--- a/Documents/Architecture/nervousnet.pptx
+++ b/Documents/Architecture/nervousnet.pptx
@@ -3698,7 +3698,7 @@
           <a:p>
             <a:fld id="{E29EADBD-8C2A-0E4C-92CE-5EBFF6224A3A}" type="datetime1">
               <a:rPr lang="en-US" smtClean="0"/>
-              <a:t>19/04/16</a:t>
+              <a:t>20/04/16</a:t>
             </a:fld>
             <a:endParaRPr lang="en-US"/>
           </a:p>
@@ -3868,7 +3868,7 @@
           <a:p>
             <a:fld id="{00A2197B-82DA-B840-975D-6BA3EE4C2DC8}" type="datetime1">
               <a:rPr lang="en-US" smtClean="0"/>
-              <a:t>19/04/16</a:t>
+              <a:t>20/04/16</a:t>
             </a:fld>
             <a:endParaRPr lang="en-US"/>
           </a:p>
@@ -4696,7 +4696,7 @@
           <a:p>
             <a:fld id="{D9367090-103A-FA49-A3B4-31066D77167B}" type="datetime1">
               <a:rPr lang="en-US" smtClean="0"/>
-              <a:t>19/04/16</a:t>
+              <a:t>20/04/16</a:t>
             </a:fld>
             <a:endParaRPr lang="en-US"/>
           </a:p>
@@ -5021,7 +5021,7 @@
           <a:p>
             <a:fld id="{ABC2C74B-38EB-6142-981A-F4874F5C558C}" type="datetime1">
               <a:rPr lang="en-US" smtClean="0"/>
-              <a:t>19/04/16</a:t>
+              <a:t>20/04/16</a:t>
             </a:fld>
             <a:endParaRPr lang="en-US"/>
           </a:p>
@@ -5302,7 +5302,7 @@
           <a:p>
             <a:fld id="{2E308B6A-9F4E-B64E-B36C-0598F402E0B0}" type="datetime1">
               <a:rPr lang="en-US" smtClean="0"/>
-              <a:t>19/04/16</a:t>
+              <a:t>20/04/16</a:t>
             </a:fld>
             <a:endParaRPr lang="en-US"/>
           </a:p>
@@ -5600,7 +5600,7 @@
           <a:p>
             <a:fld id="{85937D96-DDC1-4747-AA95-A033CACCB96C}" type="datetime1">
               <a:rPr lang="en-US" smtClean="0"/>
-              <a:t>19/04/16</a:t>
+              <a:t>20/04/16</a:t>
             </a:fld>
             <a:endParaRPr lang="en-US"/>
           </a:p>
@@ -5933,7 +5933,7 @@
           <a:p>
             <a:fld id="{5321CDED-9626-FA46-9EE7-E82FB8600649}" type="datetime1">
               <a:rPr lang="en-US" smtClean="0"/>
-              <a:t>19/04/16</a:t>
+              <a:t>20/04/16</a:t>
             </a:fld>
             <a:endParaRPr lang="en-US"/>
           </a:p>
@@ -6188,7 +6188,7 @@
           <a:p>
             <a:fld id="{1C24507A-5856-C541-981B-4412383053C8}" type="datetime1">
               <a:rPr lang="en-US" smtClean="0"/>
-              <a:t>19/04/16</a:t>
+              <a:t>20/04/16</a:t>
             </a:fld>
             <a:endParaRPr lang="en-US"/>
           </a:p>
@@ -6371,7 +6371,7 @@
           <a:p>
             <a:fld id="{6905DD47-EC52-8743-A4BF-BDFBFBA3AE81}" type="datetime1">
               <a:rPr lang="en-US" smtClean="0"/>
-              <a:t>19/04/16</a:t>
+              <a:t>20/04/16</a:t>
             </a:fld>
             <a:endParaRPr lang="en-US"/>
           </a:p>
@@ -6544,7 +6544,7 @@
           <a:p>
             <a:fld id="{1D77DB73-494B-5E4A-8019-F4524E111BAF}" type="datetime1">
               <a:rPr lang="en-US" smtClean="0"/>
-              <a:t>19/04/16</a:t>
+              <a:t>20/04/16</a:t>
             </a:fld>
             <a:endParaRPr lang="en-US"/>
           </a:p>
@@ -6817,7 +6817,7 @@
           <a:p>
             <a:fld id="{5A88EB98-4821-3849-86D7-AEAB3699D07C}" type="datetime1">
               <a:rPr lang="en-US" smtClean="0"/>
-              <a:t>19/04/16</a:t>
+              <a:t>20/04/16</a:t>
             </a:fld>
             <a:endParaRPr lang="en-US"/>
           </a:p>
@@ -7128,7 +7128,7 @@
           <a:p>
             <a:fld id="{E2211E45-9E9F-C742-80C0-3820C3566BB1}" type="datetime1">
               <a:rPr lang="en-US" smtClean="0"/>
-              <a:t>19/04/16</a:t>
+              <a:t>20/04/16</a:t>
             </a:fld>
             <a:endParaRPr lang="en-US"/>
           </a:p>
@@ -7424,7 +7424,7 @@
           <a:p>
             <a:fld id="{CB5CC828-769C-E54C-9215-692401F93968}" type="datetime1">
               <a:rPr lang="en-US" smtClean="0"/>
-              <a:t>19/04/16</a:t>
+              <a:t>20/04/16</a:t>
             </a:fld>
             <a:endParaRPr lang="en-US"/>
           </a:p>
@@ -7858,7 +7858,7 @@
           <a:p>
             <a:fld id="{1AA2AE0E-A114-5642-B6C6-FD149E76306E}" type="datetime1">
               <a:rPr lang="en-US" smtClean="0"/>
-              <a:t>19/04/16</a:t>
+              <a:t>20/04/16</a:t>
             </a:fld>
             <a:endParaRPr lang="en-US"/>
           </a:p>
@@ -8208,7 +8208,7 @@
           <a:p>
             <a:fld id="{8A715A52-2182-4049-98B2-F3202A644989}" type="datetime1">
               <a:rPr lang="en-US" smtClean="0"/>
-              <a:t>19/04/16</a:t>
+              <a:t>20/04/16</a:t>
             </a:fld>
             <a:endParaRPr lang="en-US"/>
           </a:p>
@@ -8302,7 +8302,7 @@
           <a:p>
             <a:fld id="{3CF4FDC8-DC40-7C44-B03A-3EFB3AAE78B7}" type="datetime1">
               <a:rPr lang="en-US" smtClean="0"/>
-              <a:t>19/04/16</a:t>
+              <a:t>20/04/16</a:t>
             </a:fld>
             <a:endParaRPr lang="en-US"/>
           </a:p>
@@ -8643,7 +8643,7 @@
           <a:p>
             <a:fld id="{22BC680A-A1C5-9D47-898A-4B941B6FDB12}" type="datetime1">
               <a:rPr lang="en-US" smtClean="0"/>
-              <a:t>19/04/16</a:t>
+              <a:t>20/04/16</a:t>
             </a:fld>
             <a:endParaRPr lang="en-US"/>
           </a:p>
@@ -8859,7 +8859,7 @@
           <a:p>
             <a:fld id="{A94D9655-E859-0A4D-ABA6-66C7095048D0}" type="datetime1">
               <a:rPr lang="en-US" smtClean="0"/>
-              <a:t>19/04/16</a:t>
+              <a:t>20/04/16</a:t>
             </a:fld>
             <a:endParaRPr lang="en-US"/>
           </a:p>
@@ -12910,8 +12910,8 @@
           <a:p>
             <a:pPr algn="ctr"/>
             <a:r>
-              <a:rPr lang="en-US" sz="800" dirty="0" smtClean="0"/>
-              <a:t>HUB API's</a:t>
+              <a:rPr lang="en-US" sz="800" smtClean="0"/>
+              <a:t>API's</a:t>
             </a:r>
             <a:endParaRPr lang="en-US" sz="800" dirty="0"/>
           </a:p>
@@ -13180,7 +13180,7 @@
         <p:spPr>
           <a:xfrm>
             <a:off x="890943" y="666715"/>
-            <a:ext cx="7478222" cy="5386091"/>
+            <a:ext cx="7478222" cy="4216539"/>
           </a:xfrm>
           <a:prstGeom prst="rect">
             <a:avLst/>
@@ -13232,15 +13232,7 @@
             </a:pPr>
             <a:r>
               <a:rPr lang="en-US" sz="1000" dirty="0" smtClean="0"/>
-              <a:t>Required to be installed for running external apps </a:t>
-            </a:r>
-            <a:r>
-              <a:rPr lang="en-US" sz="1000" dirty="0" smtClean="0"/>
-              <a:t>(Axons</a:t>
-            </a:r>
-            <a:r>
-              <a:rPr lang="en-US" sz="1000" dirty="0" smtClean="0"/>
-              <a:t>) built using</a:t>
+              <a:t>Required to be installed for running external apps (Axons) built using</a:t>
             </a:r>
             <a:r>
               <a:rPr lang="en-US" sz="1000" b="1" i="1" dirty="0" smtClean="0"/>
@@ -13256,11 +13248,7 @@
             </a:r>
             <a:r>
               <a:rPr lang="en-US" sz="1000" b="1" i="1" dirty="0" err="1" smtClean="0"/>
-              <a:t>Platform</a:t>
-            </a:r>
-            <a:r>
-              <a:rPr lang="en-US" sz="1000" b="1" i="1" dirty="0" err="1" smtClean="0"/>
-              <a:t>API’s</a:t>
+              <a:t>PlatformAPI’s</a:t>
             </a:r>
             <a:r>
               <a:rPr lang="en-US" sz="1000" dirty="0" smtClean="0"/>
@@ -13349,19 +13337,7 @@
             </a:pPr>
             <a:r>
               <a:rPr lang="en-US" sz="1000" dirty="0" smtClean="0"/>
-              <a:t>Uses the nervousnet </a:t>
-            </a:r>
-            <a:r>
-              <a:rPr lang="en-US" sz="1000" dirty="0" smtClean="0"/>
-              <a:t>Platform </a:t>
-            </a:r>
-            <a:r>
-              <a:rPr lang="en-US" sz="1000" dirty="0" smtClean="0"/>
-              <a:t>API's </a:t>
-            </a:r>
-            <a:r>
-              <a:rPr lang="en-US" sz="1000" dirty="0" smtClean="0"/>
-              <a:t>to receive and share sensor data.  </a:t>
+              <a:t>Uses the nervousnet Platform API's to receive and share sensor data.  </a:t>
             </a:r>
           </a:p>
           <a:p>
@@ -13411,17 +13387,8 @@
             </a:r>
             <a:r>
               <a:rPr lang="en-US" sz="1000" dirty="0" smtClean="0"/>
-              <a:t>to do connect to the nervousnet </a:t>
-            </a:r>
-            <a:r>
-              <a:rPr lang="en-US" sz="1000" dirty="0" smtClean="0"/>
-              <a:t>mobile app</a:t>
-            </a:r>
-            <a:r>
-              <a:rPr lang="en-US" sz="1000" dirty="0" smtClean="0"/>
-              <a:t>.</a:t>
-            </a:r>
-            <a:endParaRPr lang="en-US" sz="1000" dirty="0" smtClean="0"/>
+              <a:t>to do connect to the nervousnet mobile app.</a:t>
+            </a:r>
           </a:p>
           <a:p>
             <a:pPr lvl="1" algn="just"/>
@@ -13434,11 +13401,7 @@
             </a:pPr>
             <a:r>
               <a:rPr lang="en-US" sz="1100" b="1" dirty="0" smtClean="0"/>
-              <a:t>Axons </a:t>
-            </a:r>
-            <a:r>
-              <a:rPr lang="en-US" sz="1100" b="1" dirty="0" smtClean="0"/>
-              <a:t>- </a:t>
+              <a:t>Axons - </a:t>
             </a:r>
             <a:r>
               <a:rPr lang="en-US" sz="1000" dirty="0" smtClean="0"/>
@@ -13527,52 +13490,6 @@
               <a:rPr lang="en-US" sz="1000" dirty="0" smtClean="0"/>
               <a:t>Mobile Clients will have the option of selecting a server from a list.</a:t>
             </a:r>
-          </a:p>
-          <a:p>
-            <a:pPr lvl="1" algn="just"/>
-            <a:endParaRPr lang="en-US" sz="1000" dirty="0" smtClean="0"/>
-          </a:p>
-          <a:p>
-            <a:pPr marL="228600" indent="-228600">
-              <a:buFont typeface="+mj-lt"/>
-              <a:buAutoNum type="arabicPeriod"/>
-            </a:pPr>
-            <a:endParaRPr lang="en-US" sz="1100" dirty="0"/>
-          </a:p>
-          <a:p>
-            <a:pPr marL="228600" indent="-228600">
-              <a:buFont typeface="+mj-lt"/>
-              <a:buAutoNum type="arabicPeriod"/>
-            </a:pPr>
-            <a:endParaRPr lang="en-US" sz="1100" dirty="0" smtClean="0"/>
-          </a:p>
-          <a:p>
-            <a:pPr marL="228600" indent="-228600">
-              <a:buFont typeface="+mj-lt"/>
-              <a:buAutoNum type="arabicPeriod"/>
-            </a:pPr>
-            <a:endParaRPr lang="en-US" sz="1100" dirty="0"/>
-          </a:p>
-          <a:p>
-            <a:pPr marL="228600" indent="-228600">
-              <a:buFont typeface="+mj-lt"/>
-              <a:buAutoNum type="arabicPeriod"/>
-            </a:pPr>
-            <a:endParaRPr lang="en-US" sz="1100" dirty="0" smtClean="0"/>
-          </a:p>
-          <a:p>
-            <a:pPr marL="228600" indent="-228600">
-              <a:buFont typeface="+mj-lt"/>
-              <a:buAutoNum type="arabicPeriod"/>
-            </a:pPr>
-            <a:endParaRPr lang="en-US" sz="1100" b="1" dirty="0"/>
-          </a:p>
-          <a:p>
-            <a:pPr marL="228600" indent="-228600">
-              <a:buFont typeface="+mj-lt"/>
-              <a:buAutoNum type="arabicPeriod"/>
-            </a:pPr>
-            <a:endParaRPr lang="en-US" sz="1100" b="1" dirty="0"/>
           </a:p>
           <a:p>
             <a:endParaRPr lang="en-US" sz="1100" dirty="0"/>

</xml_diff>

<commit_message>
Write API for Axons
</commit_message>
<xml_diff>
--- a/Documents/Architecture/nervousnet.pptx
+++ b/Documents/Architecture/nervousnet.pptx
@@ -3698,7 +3698,7 @@
           <a:p>
             <a:fld id="{E29EADBD-8C2A-0E4C-92CE-5EBFF6224A3A}" type="datetime1">
               <a:rPr lang="en-US" smtClean="0"/>
-              <a:t>20/04/16</a:t>
+              <a:t>09.12.16</a:t>
             </a:fld>
             <a:endParaRPr lang="en-US"/>
           </a:p>
@@ -3868,7 +3868,7 @@
           <a:p>
             <a:fld id="{00A2197B-82DA-B840-975D-6BA3EE4C2DC8}" type="datetime1">
               <a:rPr lang="en-US" smtClean="0"/>
-              <a:t>20/04/16</a:t>
+              <a:t>09.12.16</a:t>
             </a:fld>
             <a:endParaRPr lang="en-US"/>
           </a:p>
@@ -4696,7 +4696,7 @@
           <a:p>
             <a:fld id="{D9367090-103A-FA49-A3B4-31066D77167B}" type="datetime1">
               <a:rPr lang="en-US" smtClean="0"/>
-              <a:t>20/04/16</a:t>
+              <a:t>09.12.16</a:t>
             </a:fld>
             <a:endParaRPr lang="en-US"/>
           </a:p>
@@ -5021,7 +5021,7 @@
           <a:p>
             <a:fld id="{ABC2C74B-38EB-6142-981A-F4874F5C558C}" type="datetime1">
               <a:rPr lang="en-US" smtClean="0"/>
-              <a:t>20/04/16</a:t>
+              <a:t>09.12.16</a:t>
             </a:fld>
             <a:endParaRPr lang="en-US"/>
           </a:p>
@@ -5302,7 +5302,7 @@
           <a:p>
             <a:fld id="{2E308B6A-9F4E-B64E-B36C-0598F402E0B0}" type="datetime1">
               <a:rPr lang="en-US" smtClean="0"/>
-              <a:t>20/04/16</a:t>
+              <a:t>09.12.16</a:t>
             </a:fld>
             <a:endParaRPr lang="en-US"/>
           </a:p>
@@ -5600,7 +5600,7 @@
           <a:p>
             <a:fld id="{85937D96-DDC1-4747-AA95-A033CACCB96C}" type="datetime1">
               <a:rPr lang="en-US" smtClean="0"/>
-              <a:t>20/04/16</a:t>
+              <a:t>09.12.16</a:t>
             </a:fld>
             <a:endParaRPr lang="en-US"/>
           </a:p>
@@ -5933,7 +5933,7 @@
           <a:p>
             <a:fld id="{5321CDED-9626-FA46-9EE7-E82FB8600649}" type="datetime1">
               <a:rPr lang="en-US" smtClean="0"/>
-              <a:t>20/04/16</a:t>
+              <a:t>09.12.16</a:t>
             </a:fld>
             <a:endParaRPr lang="en-US"/>
           </a:p>
@@ -6188,7 +6188,7 @@
           <a:p>
             <a:fld id="{1C24507A-5856-C541-981B-4412383053C8}" type="datetime1">
               <a:rPr lang="en-US" smtClean="0"/>
-              <a:t>20/04/16</a:t>
+              <a:t>09.12.16</a:t>
             </a:fld>
             <a:endParaRPr lang="en-US"/>
           </a:p>
@@ -6371,7 +6371,7 @@
           <a:p>
             <a:fld id="{6905DD47-EC52-8743-A4BF-BDFBFBA3AE81}" type="datetime1">
               <a:rPr lang="en-US" smtClean="0"/>
-              <a:t>20/04/16</a:t>
+              <a:t>09.12.16</a:t>
             </a:fld>
             <a:endParaRPr lang="en-US"/>
           </a:p>
@@ -6544,7 +6544,7 @@
           <a:p>
             <a:fld id="{1D77DB73-494B-5E4A-8019-F4524E111BAF}" type="datetime1">
               <a:rPr lang="en-US" smtClean="0"/>
-              <a:t>20/04/16</a:t>
+              <a:t>09.12.16</a:t>
             </a:fld>
             <a:endParaRPr lang="en-US"/>
           </a:p>
@@ -6817,7 +6817,7 @@
           <a:p>
             <a:fld id="{5A88EB98-4821-3849-86D7-AEAB3699D07C}" type="datetime1">
               <a:rPr lang="en-US" smtClean="0"/>
-              <a:t>20/04/16</a:t>
+              <a:t>09.12.16</a:t>
             </a:fld>
             <a:endParaRPr lang="en-US"/>
           </a:p>
@@ -7128,7 +7128,7 @@
           <a:p>
             <a:fld id="{E2211E45-9E9F-C742-80C0-3820C3566BB1}" type="datetime1">
               <a:rPr lang="en-US" smtClean="0"/>
-              <a:t>20/04/16</a:t>
+              <a:t>09.12.16</a:t>
             </a:fld>
             <a:endParaRPr lang="en-US"/>
           </a:p>
@@ -7424,7 +7424,7 @@
           <a:p>
             <a:fld id="{CB5CC828-769C-E54C-9215-692401F93968}" type="datetime1">
               <a:rPr lang="en-US" smtClean="0"/>
-              <a:t>20/04/16</a:t>
+              <a:t>09.12.16</a:t>
             </a:fld>
             <a:endParaRPr lang="en-US"/>
           </a:p>
@@ -7858,7 +7858,7 @@
           <a:p>
             <a:fld id="{1AA2AE0E-A114-5642-B6C6-FD149E76306E}" type="datetime1">
               <a:rPr lang="en-US" smtClean="0"/>
-              <a:t>20/04/16</a:t>
+              <a:t>09.12.16</a:t>
             </a:fld>
             <a:endParaRPr lang="en-US"/>
           </a:p>
@@ -8208,7 +8208,7 @@
           <a:p>
             <a:fld id="{8A715A52-2182-4049-98B2-F3202A644989}" type="datetime1">
               <a:rPr lang="en-US" smtClean="0"/>
-              <a:t>20/04/16</a:t>
+              <a:t>09.12.16</a:t>
             </a:fld>
             <a:endParaRPr lang="en-US"/>
           </a:p>
@@ -8302,7 +8302,7 @@
           <a:p>
             <a:fld id="{3CF4FDC8-DC40-7C44-B03A-3EFB3AAE78B7}" type="datetime1">
               <a:rPr lang="en-US" smtClean="0"/>
-              <a:t>20/04/16</a:t>
+              <a:t>09.12.16</a:t>
             </a:fld>
             <a:endParaRPr lang="en-US"/>
           </a:p>
@@ -8643,7 +8643,7 @@
           <a:p>
             <a:fld id="{22BC680A-A1C5-9D47-898A-4B941B6FDB12}" type="datetime1">
               <a:rPr lang="en-US" smtClean="0"/>
-              <a:t>20/04/16</a:t>
+              <a:t>09.12.16</a:t>
             </a:fld>
             <a:endParaRPr lang="en-US"/>
           </a:p>
@@ -8859,7 +8859,7 @@
           <a:p>
             <a:fld id="{A94D9655-E859-0A4D-ABA6-66C7095048D0}" type="datetime1">
               <a:rPr lang="en-US" smtClean="0"/>
-              <a:t>20/04/16</a:t>
+              <a:t>09.12.16</a:t>
             </a:fld>
             <a:endParaRPr lang="en-US"/>
           </a:p>
@@ -9515,7 +9515,7 @@
           <a:p>
             <a:pPr algn="ctr"/>
             <a:r>
-              <a:rPr lang="en-US" sz="600" dirty="0" smtClean="0">
+              <a:rPr lang="en-US" sz="600" b="1" dirty="0" smtClean="0">
                 <a:solidFill>
                   <a:schemeClr val="bg1">
                     <a:lumMod val="75000"/>
@@ -9524,7 +9524,53 @@
               </a:rPr>
               <a:t>Author: ppulikal@ethz.ch</a:t>
             </a:r>
-            <a:endParaRPr lang="en-US" sz="600" dirty="0">
+            <a:endParaRPr lang="en-US" sz="600" b="1" dirty="0">
+              <a:solidFill>
+                <a:schemeClr val="bg1">
+                  <a:lumMod val="75000"/>
+                </a:schemeClr>
+              </a:solidFill>
+            </a:endParaRPr>
+          </a:p>
+        </p:txBody>
+      </p:sp>
+      <p:sp>
+        <p:nvSpPr>
+          <p:cNvPr id="7" name="TextBox 6"/>
+          <p:cNvSpPr txBox="1"/>
+          <p:nvPr/>
+        </p:nvSpPr>
+        <p:spPr>
+          <a:xfrm>
+            <a:off x="914399" y="4749112"/>
+            <a:ext cx="1957465" cy="246221"/>
+          </a:xfrm>
+          <a:prstGeom prst="rect">
+            <a:avLst/>
+          </a:prstGeom>
+          <a:noFill/>
+          <a:ln>
+            <a:noFill/>
+          </a:ln>
+        </p:spPr>
+        <p:txBody>
+          <a:bodyPr wrap="square" rtlCol="0">
+            <a:spAutoFit/>
+          </a:bodyPr>
+          <a:lstStyle/>
+          <a:p>
+            <a:pPr algn="ctr"/>
+            <a:r>
+              <a:rPr lang="en-US" sz="1000" b="1" dirty="0" smtClean="0">
+                <a:solidFill>
+                  <a:schemeClr val="bg1">
+                    <a:lumMod val="75000"/>
+                  </a:schemeClr>
+                </a:solidFill>
+              </a:rPr>
+              <a:t>Author: Prasad P. Pulikal</a:t>
+            </a:r>
+            <a:endParaRPr lang="en-US" sz="1000" b="1" dirty="0">
               <a:solidFill>
                 <a:schemeClr val="bg1">
                   <a:lumMod val="75000"/>
@@ -10875,8 +10921,8 @@
         </p:nvSpPr>
         <p:spPr>
           <a:xfrm>
-            <a:off x="2360479" y="1676361"/>
-            <a:ext cx="768109" cy="215444"/>
+            <a:off x="2308358" y="1516960"/>
+            <a:ext cx="748923" cy="338554"/>
           </a:xfrm>
           <a:prstGeom prst="rect">
             <a:avLst/>
@@ -10889,11 +10935,19 @@
           </a:bodyPr>
           <a:lstStyle/>
           <a:p>
-            <a:r>
-              <a:rPr lang="en-US" sz="800" dirty="0" smtClean="0"/>
-              <a:t>Mobile App</a:t>
-            </a:r>
-            <a:endParaRPr lang="en-US" sz="800" dirty="0"/>
+            <a:pPr algn="ctr"/>
+            <a:r>
+              <a:rPr lang="en-US" sz="800" b="1" dirty="0" smtClean="0"/>
+              <a:t>Nervousnet</a:t>
+            </a:r>
+          </a:p>
+          <a:p>
+            <a:pPr algn="ctr"/>
+            <a:r>
+              <a:rPr lang="en-US" sz="800" b="1" dirty="0" smtClean="0"/>
+              <a:t>HUB</a:t>
+            </a:r>
+            <a:endParaRPr lang="en-US" sz="800" b="1" dirty="0"/>
           </a:p>
         </p:txBody>
       </p:sp>
@@ -10921,17 +10975,17 @@
           <a:p>
             <a:pPr algn="ctr"/>
             <a:r>
-              <a:rPr lang="en-US" sz="1100" dirty="0" smtClean="0"/>
+              <a:rPr lang="en-US" sz="1100" b="1" dirty="0" smtClean="0"/>
               <a:t>Nervousnet CORE</a:t>
             </a:r>
           </a:p>
           <a:p>
             <a:pPr algn="ctr"/>
             <a:r>
-              <a:rPr lang="en-US" sz="1100" dirty="0" smtClean="0"/>
+              <a:rPr lang="en-US" sz="1100" b="1" dirty="0" smtClean="0"/>
               <a:t>( Distributed Servers )</a:t>
             </a:r>
-            <a:endParaRPr lang="en-US" sz="1100" dirty="0"/>
+            <a:endParaRPr lang="en-US" sz="1100" b="1" dirty="0"/>
           </a:p>
         </p:txBody>
       </p:sp>
@@ -11048,8 +11102,8 @@
         </p:nvSpPr>
         <p:spPr>
           <a:xfrm>
-            <a:off x="2304908" y="2942139"/>
-            <a:ext cx="571891" cy="338554"/>
+            <a:off x="2299748" y="2942139"/>
+            <a:ext cx="582211" cy="338554"/>
           </a:xfrm>
           <a:prstGeom prst="rect">
             <a:avLst/>
@@ -11064,17 +11118,17 @@
           <a:p>
             <a:pPr algn="ctr"/>
             <a:r>
-              <a:rPr lang="en-US" sz="800" dirty="0" smtClean="0"/>
+              <a:rPr lang="en-US" sz="800" b="1" dirty="0" smtClean="0"/>
               <a:t>IOT</a:t>
             </a:r>
           </a:p>
           <a:p>
             <a:pPr algn="ctr"/>
             <a:r>
-              <a:rPr lang="en-US" sz="800" dirty="0" smtClean="0"/>
+              <a:rPr lang="en-US" sz="800" b="1" dirty="0" smtClean="0"/>
               <a:t>devices</a:t>
             </a:r>
-            <a:endParaRPr lang="en-US" sz="800" dirty="0"/>
+            <a:endParaRPr lang="en-US" sz="800" b="1" dirty="0"/>
           </a:p>
         </p:txBody>
       </p:sp>
@@ -11276,8 +11330,8 @@
         </p:nvSpPr>
         <p:spPr>
           <a:xfrm>
-            <a:off x="2303887" y="4592311"/>
-            <a:ext cx="639919" cy="338554"/>
+            <a:off x="2300681" y="4592311"/>
+            <a:ext cx="646331" cy="338554"/>
           </a:xfrm>
           <a:prstGeom prst="rect">
             <a:avLst/>
@@ -11292,17 +11346,17 @@
           <a:p>
             <a:pPr algn="ctr"/>
             <a:r>
-              <a:rPr lang="en-US" sz="800" dirty="0" smtClean="0"/>
+              <a:rPr lang="en-US" sz="800" b="1" dirty="0" smtClean="0"/>
               <a:t>Partner</a:t>
             </a:r>
           </a:p>
           <a:p>
             <a:pPr algn="ctr"/>
             <a:r>
-              <a:rPr lang="en-US" sz="800" dirty="0" smtClean="0"/>
+              <a:rPr lang="en-US" sz="800" b="1" dirty="0" smtClean="0"/>
               <a:t>Platforms</a:t>
             </a:r>
-            <a:endParaRPr lang="en-US" sz="800" dirty="0"/>
+            <a:endParaRPr lang="en-US" sz="800" b="1" dirty="0"/>
           </a:p>
         </p:txBody>
       </p:sp>
@@ -12392,10 +12446,10 @@
           <a:lstStyle/>
           <a:p>
             <a:r>
-              <a:rPr lang="en-US" sz="800" dirty="0" smtClean="0"/>
+              <a:rPr lang="en-US" sz="800" b="1" dirty="0" smtClean="0"/>
               <a:t>Analyze</a:t>
             </a:r>
-            <a:endParaRPr lang="en-US" sz="800" dirty="0"/>
+            <a:endParaRPr lang="en-US" sz="800" b="1" dirty="0"/>
           </a:p>
         </p:txBody>
       </p:sp>
@@ -12473,8 +12527,8 @@
         </p:nvSpPr>
         <p:spPr>
           <a:xfrm>
-            <a:off x="7430105" y="4601614"/>
-            <a:ext cx="458479" cy="215444"/>
+            <a:off x="7425472" y="4601614"/>
+            <a:ext cx="467746" cy="215444"/>
           </a:xfrm>
           <a:prstGeom prst="rect">
             <a:avLst/>
@@ -12489,10 +12543,10 @@
           <a:p>
             <a:pPr algn="ctr"/>
             <a:r>
-              <a:rPr lang="en-US" sz="800" dirty="0" smtClean="0"/>
+              <a:rPr lang="en-US" sz="800" b="1" dirty="0" smtClean="0"/>
               <a:t>Utilize</a:t>
             </a:r>
-            <a:endParaRPr lang="en-US" sz="800" dirty="0"/>
+            <a:endParaRPr lang="en-US" sz="800" b="1" dirty="0"/>
           </a:p>
         </p:txBody>
       </p:sp>
@@ -12531,7 +12585,7 @@
         <p:spPr>
           <a:xfrm>
             <a:off x="7432002" y="2921414"/>
-            <a:ext cx="601347" cy="215444"/>
+            <a:ext cx="620683" cy="215444"/>
           </a:xfrm>
           <a:prstGeom prst="rect">
             <a:avLst/>
@@ -12545,10 +12599,10 @@
           <a:lstStyle/>
           <a:p>
             <a:r>
-              <a:rPr lang="en-US" sz="800" dirty="0" smtClean="0"/>
+              <a:rPr lang="en-US" sz="800" b="1" dirty="0" smtClean="0"/>
               <a:t>Visualize</a:t>
             </a:r>
-            <a:endParaRPr lang="en-US" sz="800" dirty="0"/>
+            <a:endParaRPr lang="en-US" sz="800" b="1" dirty="0"/>
           </a:p>
         </p:txBody>
       </p:sp>

</xml_diff>